<commit_message>
[lab2] election seems to work
</commit_message>
<xml_diff>
--- a/lab2/Lab Introduction.pptx
+++ b/lab2/Lab Introduction.pptx
@@ -190,7 +190,7 @@
       </p14:sectionLst>
     </p:ext>
     <p:ext uri="{EFAFB233-063F-42B5-8137-9DF3F51BA10A}">
-      <p15:sldGuideLst xmlns:p15="http://schemas.microsoft.com/office/powerpoint/2012/main" xmlns="">
+      <p15:sldGuideLst xmlns:p15="http://schemas.microsoft.com/office/powerpoint/2012/main">
         <p15:guide id="1" orient="horz" pos="2160">
           <p15:clr>
             <a:srgbClr val="A4A3A4"/>
@@ -3926,7 +3926,7 @@
           <a:p>
             <a:fld id="{8FF77790-42C4-4453-BF50-3359CAA38547}" type="datetimeFigureOut">
               <a:rPr lang="sv-SE" smtClean="0"/>
-              <a:t>11/11/16</a:t>
+              <a:t>2016-11-16</a:t>
             </a:fld>
             <a:endParaRPr lang="sv-SE"/>
           </a:p>
@@ -6042,7 +6042,7 @@
           <a:p>
             <a:fld id="{12BAC67F-60A3-4DB6-B99C-E5139C05EEDB}" type="datetimeFigureOut">
               <a:rPr lang="sv-SE" smtClean="0"/>
-              <a:t>11/11/16</a:t>
+              <a:t>2016-11-16</a:t>
             </a:fld>
             <a:endParaRPr lang="sv-SE"/>
           </a:p>
@@ -6212,7 +6212,7 @@
           <a:p>
             <a:fld id="{12BAC67F-60A3-4DB6-B99C-E5139C05EEDB}" type="datetimeFigureOut">
               <a:rPr lang="sv-SE" smtClean="0"/>
-              <a:t>11/11/16</a:t>
+              <a:t>2016-11-16</a:t>
             </a:fld>
             <a:endParaRPr lang="sv-SE"/>
           </a:p>
@@ -6392,7 +6392,7 @@
           <a:p>
             <a:fld id="{12BAC67F-60A3-4DB6-B99C-E5139C05EEDB}" type="datetimeFigureOut">
               <a:rPr lang="sv-SE" smtClean="0"/>
-              <a:t>11/11/16</a:t>
+              <a:t>2016-11-16</a:t>
             </a:fld>
             <a:endParaRPr lang="sv-SE"/>
           </a:p>
@@ -6562,7 +6562,7 @@
           <a:p>
             <a:fld id="{12BAC67F-60A3-4DB6-B99C-E5139C05EEDB}" type="datetimeFigureOut">
               <a:rPr lang="sv-SE" smtClean="0"/>
-              <a:t>11/11/16</a:t>
+              <a:t>2016-11-16</a:t>
             </a:fld>
             <a:endParaRPr lang="sv-SE"/>
           </a:p>
@@ -6808,7 +6808,7 @@
           <a:p>
             <a:fld id="{12BAC67F-60A3-4DB6-B99C-E5139C05EEDB}" type="datetimeFigureOut">
               <a:rPr lang="sv-SE" smtClean="0"/>
-              <a:t>11/11/16</a:t>
+              <a:t>2016-11-16</a:t>
             </a:fld>
             <a:endParaRPr lang="sv-SE"/>
           </a:p>
@@ -7096,7 +7096,7 @@
           <a:p>
             <a:fld id="{12BAC67F-60A3-4DB6-B99C-E5139C05EEDB}" type="datetimeFigureOut">
               <a:rPr lang="sv-SE" smtClean="0"/>
-              <a:t>11/11/16</a:t>
+              <a:t>2016-11-16</a:t>
             </a:fld>
             <a:endParaRPr lang="sv-SE"/>
           </a:p>
@@ -7518,7 +7518,7 @@
           <a:p>
             <a:fld id="{12BAC67F-60A3-4DB6-B99C-E5139C05EEDB}" type="datetimeFigureOut">
               <a:rPr lang="sv-SE" smtClean="0"/>
-              <a:t>11/11/16</a:t>
+              <a:t>2016-11-16</a:t>
             </a:fld>
             <a:endParaRPr lang="sv-SE"/>
           </a:p>
@@ -7636,7 +7636,7 @@
           <a:p>
             <a:fld id="{12BAC67F-60A3-4DB6-B99C-E5139C05EEDB}" type="datetimeFigureOut">
               <a:rPr lang="sv-SE" smtClean="0"/>
-              <a:t>11/11/16</a:t>
+              <a:t>2016-11-16</a:t>
             </a:fld>
             <a:endParaRPr lang="sv-SE"/>
           </a:p>
@@ -7731,7 +7731,7 @@
           <a:p>
             <a:fld id="{12BAC67F-60A3-4DB6-B99C-E5139C05EEDB}" type="datetimeFigureOut">
               <a:rPr lang="sv-SE" smtClean="0"/>
-              <a:t>11/11/16</a:t>
+              <a:t>2016-11-16</a:t>
             </a:fld>
             <a:endParaRPr lang="sv-SE"/>
           </a:p>
@@ -8008,7 +8008,7 @@
           <a:p>
             <a:fld id="{12BAC67F-60A3-4DB6-B99C-E5139C05EEDB}" type="datetimeFigureOut">
               <a:rPr lang="sv-SE" smtClean="0"/>
-              <a:t>11/11/16</a:t>
+              <a:t>2016-11-16</a:t>
             </a:fld>
             <a:endParaRPr lang="sv-SE"/>
           </a:p>
@@ -8261,7 +8261,7 @@
           <a:p>
             <a:fld id="{12BAC67F-60A3-4DB6-B99C-E5139C05EEDB}" type="datetimeFigureOut">
               <a:rPr lang="sv-SE" smtClean="0"/>
-              <a:t>11/11/16</a:t>
+              <a:t>2016-11-16</a:t>
             </a:fld>
             <a:endParaRPr lang="sv-SE"/>
           </a:p>
@@ -8474,7 +8474,7 @@
           <a:p>
             <a:fld id="{12BAC67F-60A3-4DB6-B99C-E5139C05EEDB}" type="datetimeFigureOut">
               <a:rPr lang="sv-SE" smtClean="0"/>
-              <a:t>11/11/16</a:t>
+              <a:t>2016-11-16</a:t>
             </a:fld>
             <a:endParaRPr lang="sv-SE"/>
           </a:p>
@@ -8973,7 +8973,7 @@
           <a:noFill/>
           <a:extLst>
             <a:ext uri="{909E8E84-426E-40dd-AFC4-6F175D3DCCD1}">
-              <a14:hiddenFill xmlns:a14="http://schemas.microsoft.com/office/drawing/2010/main">
+              <a14:hiddenFill xmlns:a14="http://schemas.microsoft.com/office/drawing/2010/main" xmlns="">
                 <a:solidFill>
                   <a:srgbClr val="FFFFFF"/>
                 </a:solidFill>
@@ -9014,7 +9014,7 @@
           <a:noFill/>
           <a:extLst>
             <a:ext uri="{909E8E84-426E-40dd-AFC4-6F175D3DCCD1}">
-              <a14:hiddenFill xmlns:a14="http://schemas.microsoft.com/office/drawing/2010/main">
+              <a14:hiddenFill xmlns:a14="http://schemas.microsoft.com/office/drawing/2010/main" xmlns="">
                 <a:solidFill>
                   <a:srgbClr val="FFFFFF"/>
                 </a:solidFill>
@@ -9044,7 +9044,7 @@
   <p:timing>
     <p:tnLst>
       <p:par>
-        <p:cTn xmlns:p14="http://schemas.microsoft.com/office/powerpoint/2010/main" id="1" dur="indefinite" restart="never" nodeType="tmRoot"/>
+        <p:cTn id="1" dur="indefinite" restart="never" nodeType="tmRoot"/>
       </p:par>
     </p:tnLst>
   </p:timing>
@@ -9157,7 +9157,7 @@
   <p:timing>
     <p:tnLst>
       <p:par>
-        <p:cTn xmlns:p14="http://schemas.microsoft.com/office/powerpoint/2010/main" id="1" dur="indefinite" restart="never" nodeType="tmRoot"/>
+        <p:cTn id="1" dur="indefinite" restart="never" nodeType="tmRoot"/>
       </p:par>
     </p:tnLst>
   </p:timing>
@@ -9352,7 +9352,7 @@
   <p:timing>
     <p:tnLst>
       <p:par>
-        <p:cTn xmlns:p14="http://schemas.microsoft.com/office/powerpoint/2010/main" id="1" dur="indefinite" restart="never" nodeType="tmRoot">
+        <p:cTn id="1" dur="indefinite" restart="never" nodeType="tmRoot">
           <p:childTnLst>
             <p:seq concurrent="1" nextAc="seek">
               <p:cTn id="2" dur="indefinite" nodeType="mainSeq">
@@ -9658,7 +9658,7 @@
   <p:timing>
     <p:tnLst>
       <p:par>
-        <p:cTn xmlns:p14="http://schemas.microsoft.com/office/powerpoint/2010/main" id="1" dur="indefinite" restart="never" nodeType="tmRoot"/>
+        <p:cTn id="1" dur="indefinite" restart="never" nodeType="tmRoot"/>
       </p:par>
     </p:tnLst>
   </p:timing>
@@ -9817,7 +9817,7 @@
   <p:timing>
     <p:tnLst>
       <p:par>
-        <p:cTn xmlns:p14="http://schemas.microsoft.com/office/powerpoint/2010/main" id="1" dur="indefinite" restart="never" nodeType="tmRoot"/>
+        <p:cTn id="1" dur="indefinite" restart="never" nodeType="tmRoot"/>
       </p:par>
     </p:tnLst>
   </p:timing>
@@ -9957,7 +9957,7 @@
   <p:timing>
     <p:tnLst>
       <p:par>
-        <p:cTn xmlns:p14="http://schemas.microsoft.com/office/powerpoint/2010/main" id="1" dur="indefinite" restart="never" nodeType="tmRoot"/>
+        <p:cTn id="1" dur="indefinite" restart="never" nodeType="tmRoot"/>
       </p:par>
     </p:tnLst>
   </p:timing>
@@ -10084,7 +10084,7 @@
   <p:timing>
     <p:tnLst>
       <p:par>
-        <p:cTn xmlns:p14="http://schemas.microsoft.com/office/powerpoint/2010/main" id="1" dur="indefinite" restart="never" nodeType="tmRoot"/>
+        <p:cTn id="1" dur="indefinite" restart="never" nodeType="tmRoot"/>
       </p:par>
     </p:tnLst>
   </p:timing>
@@ -10241,7 +10241,7 @@
   <p:timing>
     <p:tnLst>
       <p:par>
-        <p:cTn xmlns:p14="http://schemas.microsoft.com/office/powerpoint/2010/main" id="1" dur="indefinite" restart="never" nodeType="tmRoot"/>
+        <p:cTn id="1" dur="indefinite" restart="never" nodeType="tmRoot"/>
       </p:par>
     </p:tnLst>
   </p:timing>
@@ -10374,7 +10374,7 @@
   <p:timing>
     <p:tnLst>
       <p:par>
-        <p:cTn xmlns:p14="http://schemas.microsoft.com/office/powerpoint/2010/main" id="1" dur="indefinite" restart="never" nodeType="tmRoot"/>
+        <p:cTn id="1" dur="indefinite" restart="never" nodeType="tmRoot"/>
       </p:par>
     </p:tnLst>
   </p:timing>
@@ -10689,7 +10689,7 @@
   <p:timing>
     <p:tnLst>
       <p:par>
-        <p:cTn xmlns:p14="http://schemas.microsoft.com/office/powerpoint/2010/main" id="1" dur="indefinite" restart="never" nodeType="tmRoot"/>
+        <p:cTn id="1" dur="indefinite" restart="never" nodeType="tmRoot"/>
       </p:par>
     </p:tnLst>
   </p:timing>
@@ -11403,7 +11403,7 @@
   <p:timing>
     <p:tnLst>
       <p:par>
-        <p:cTn xmlns:p14="http://schemas.microsoft.com/office/powerpoint/2010/main" id="1" dur="indefinite" restart="never" nodeType="tmRoot"/>
+        <p:cTn id="1" dur="indefinite" restart="never" nodeType="tmRoot"/>
       </p:par>
     </p:tnLst>
   </p:timing>
@@ -11538,7 +11538,7 @@
   <p:timing>
     <p:tnLst>
       <p:par>
-        <p:cTn xmlns:p14="http://schemas.microsoft.com/office/powerpoint/2010/main" id="1" dur="indefinite" restart="never" nodeType="tmRoot"/>
+        <p:cTn id="1" dur="indefinite" restart="never" nodeType="tmRoot"/>
       </p:par>
     </p:tnLst>
   </p:timing>
@@ -12325,7 +12325,7 @@
   <p:timing>
     <p:tnLst>
       <p:par>
-        <p:cTn xmlns:p14="http://schemas.microsoft.com/office/powerpoint/2010/main" id="1" dur="indefinite" restart="never" nodeType="tmRoot"/>
+        <p:cTn id="1" dur="indefinite" restart="never" nodeType="tmRoot"/>
       </p:par>
     </p:tnLst>
   </p:timing>
@@ -12422,7 +12422,7 @@
   <p:timing>
     <p:tnLst>
       <p:par>
-        <p:cTn xmlns:p14="http://schemas.microsoft.com/office/powerpoint/2010/main" id="1" dur="indefinite" restart="never" nodeType="tmRoot"/>
+        <p:cTn id="1" dur="indefinite" restart="never" nodeType="tmRoot"/>
       </p:par>
     </p:tnLst>
   </p:timing>
@@ -12553,7 +12553,7 @@
   <p:timing>
     <p:tnLst>
       <p:par>
-        <p:cTn xmlns:p14="http://schemas.microsoft.com/office/powerpoint/2010/main" id="1" dur="indefinite" restart="never" nodeType="tmRoot"/>
+        <p:cTn id="1" dur="indefinite" restart="never" nodeType="tmRoot"/>
       </p:par>
     </p:tnLst>
   </p:timing>
@@ -12662,7 +12662,7 @@
   <p:timing>
     <p:tnLst>
       <p:par>
-        <p:cTn xmlns:p14="http://schemas.microsoft.com/office/powerpoint/2010/main" id="1" dur="indefinite" restart="never" nodeType="tmRoot"/>
+        <p:cTn id="1" dur="indefinite" restart="never" nodeType="tmRoot"/>
       </p:par>
     </p:tnLst>
   </p:timing>
@@ -12850,7 +12850,7 @@
   <p:timing>
     <p:tnLst>
       <p:par>
-        <p:cTn xmlns:p14="http://schemas.microsoft.com/office/powerpoint/2010/main" id="1" dur="indefinite" restart="never" nodeType="tmRoot"/>
+        <p:cTn id="1" dur="indefinite" restart="never" nodeType="tmRoot"/>
       </p:par>
     </p:tnLst>
   </p:timing>
@@ -13691,7 +13691,7 @@
   <p:timing>
     <p:tnLst>
       <p:par>
-        <p:cTn xmlns:p14="http://schemas.microsoft.com/office/powerpoint/2010/main" id="1" dur="indefinite" restart="never" nodeType="tmRoot"/>
+        <p:cTn id="1" dur="indefinite" restart="never" nodeType="tmRoot"/>
       </p:par>
     </p:tnLst>
   </p:timing>
@@ -14622,7 +14622,7 @@
   <p:timing>
     <p:tnLst>
       <p:par>
-        <p:cTn xmlns:p14="http://schemas.microsoft.com/office/powerpoint/2010/main" id="1" dur="indefinite" restart="never" nodeType="tmRoot"/>
+        <p:cTn id="1" dur="indefinite" restart="never" nodeType="tmRoot"/>
       </p:par>
     </p:tnLst>
   </p:timing>
@@ -15560,7 +15560,7 @@
   <p:timing>
     <p:tnLst>
       <p:par>
-        <p:cTn xmlns:p14="http://schemas.microsoft.com/office/powerpoint/2010/main" id="1" dur="indefinite" restart="never" nodeType="tmRoot"/>
+        <p:cTn id="1" dur="indefinite" restart="never" nodeType="tmRoot"/>
       </p:par>
     </p:tnLst>
   </p:timing>
@@ -16534,7 +16534,7 @@
   <p:timing>
     <p:tnLst>
       <p:par>
-        <p:cTn xmlns:p14="http://schemas.microsoft.com/office/powerpoint/2010/main" id="1" dur="indefinite" restart="never" nodeType="tmRoot"/>
+        <p:cTn id="1" dur="indefinite" restart="never" nodeType="tmRoot"/>
       </p:par>
     </p:tnLst>
   </p:timing>
@@ -17674,7 +17674,7 @@
   <p:timing>
     <p:tnLst>
       <p:par>
-        <p:cTn xmlns:p14="http://schemas.microsoft.com/office/powerpoint/2010/main" id="1" dur="indefinite" restart="never" nodeType="tmRoot"/>
+        <p:cTn id="1" dur="indefinite" restart="never" nodeType="tmRoot"/>
       </p:par>
     </p:tnLst>
   </p:timing>
@@ -18171,7 +18171,7 @@
   <p:timing>
     <p:tnLst>
       <p:par>
-        <p:cTn xmlns:p14="http://schemas.microsoft.com/office/powerpoint/2010/main" id="1" dur="indefinite" restart="never" nodeType="tmRoot"/>
+        <p:cTn id="1" dur="indefinite" restart="never" nodeType="tmRoot"/>
       </p:par>
     </p:tnLst>
   </p:timing>
@@ -19225,7 +19225,7 @@
   <p:timing>
     <p:tnLst>
       <p:par>
-        <p:cTn xmlns:p14="http://schemas.microsoft.com/office/powerpoint/2010/main" id="1" dur="indefinite" restart="never" nodeType="tmRoot"/>
+        <p:cTn id="1" dur="indefinite" restart="never" nodeType="tmRoot"/>
       </p:par>
     </p:tnLst>
   </p:timing>
@@ -19391,7 +19391,7 @@
   <p:timing>
     <p:tnLst>
       <p:par>
-        <p:cTn xmlns:p14="http://schemas.microsoft.com/office/powerpoint/2010/main" id="1" dur="indefinite" restart="never" nodeType="tmRoot"/>
+        <p:cTn id="1" dur="indefinite" restart="never" nodeType="tmRoot"/>
       </p:par>
     </p:tnLst>
   </p:timing>
@@ -20460,7 +20460,7 @@
   <p:timing>
     <p:tnLst>
       <p:par>
-        <p:cTn xmlns:p14="http://schemas.microsoft.com/office/powerpoint/2010/main" id="1" dur="indefinite" restart="never" nodeType="tmRoot"/>
+        <p:cTn id="1" dur="indefinite" restart="never" nodeType="tmRoot"/>
       </p:par>
     </p:tnLst>
   </p:timing>
@@ -21647,7 +21647,7 @@
   <p:timing>
     <p:tnLst>
       <p:par>
-        <p:cTn xmlns:p14="http://schemas.microsoft.com/office/powerpoint/2010/main" id="1" dur="indefinite" restart="never" nodeType="tmRoot"/>
+        <p:cTn id="1" dur="indefinite" restart="never" nodeType="tmRoot"/>
       </p:par>
     </p:tnLst>
   </p:timing>
@@ -22916,7 +22916,7 @@
   <p:timing>
     <p:tnLst>
       <p:par>
-        <p:cTn xmlns:p14="http://schemas.microsoft.com/office/powerpoint/2010/main" id="1" dur="indefinite" restart="never" nodeType="tmRoot"/>
+        <p:cTn id="1" dur="indefinite" restart="never" nodeType="tmRoot"/>
       </p:par>
     </p:tnLst>
   </p:timing>
@@ -24131,7 +24131,7 @@
   <p:timing>
     <p:tnLst>
       <p:par>
-        <p:cTn xmlns:p14="http://schemas.microsoft.com/office/powerpoint/2010/main" id="1" dur="indefinite" restart="never" nodeType="tmRoot"/>
+        <p:cTn id="1" dur="indefinite" restart="never" nodeType="tmRoot"/>
       </p:par>
     </p:tnLst>
   </p:timing>
@@ -25249,7 +25249,7 @@
   <p:timing>
     <p:tnLst>
       <p:par>
-        <p:cTn xmlns:p14="http://schemas.microsoft.com/office/powerpoint/2010/main" id="1" dur="indefinite" restart="never" nodeType="tmRoot"/>
+        <p:cTn id="1" dur="indefinite" restart="never" nodeType="tmRoot"/>
       </p:par>
     </p:tnLst>
   </p:timing>
@@ -25331,7 +25331,7 @@
   <p:timing>
     <p:tnLst>
       <p:par>
-        <p:cTn xmlns:p14="http://schemas.microsoft.com/office/powerpoint/2010/main" id="1" dur="indefinite" restart="never" nodeType="tmRoot"/>
+        <p:cTn id="1" dur="indefinite" restart="never" nodeType="tmRoot"/>
       </p:par>
     </p:tnLst>
   </p:timing>
@@ -25473,7 +25473,7 @@
         </p:nvGraphicFramePr>
         <p:xfrm>
           <a:off x="395536" y="2996952"/>
-          <a:ext cx="8352928" cy="3698141"/>
+          <a:ext cx="8352928" cy="3847837"/>
         </p:xfrm>
         <a:graphic>
           <a:graphicData uri="http://schemas.openxmlformats.org/drawingml/2006/table">
@@ -26402,7 +26402,7 @@
   <p:timing>
     <p:tnLst>
       <p:par>
-        <p:cTn xmlns:p14="http://schemas.microsoft.com/office/powerpoint/2010/main" id="1" dur="indefinite" restart="never" nodeType="tmRoot"/>
+        <p:cTn id="1" dur="indefinite" restart="never" nodeType="tmRoot"/>
       </p:par>
     </p:tnLst>
   </p:timing>
@@ -26485,7 +26485,7 @@
   <p:timing>
     <p:tnLst>
       <p:par>
-        <p:cTn xmlns:p14="http://schemas.microsoft.com/office/powerpoint/2010/main" id="1" dur="indefinite" restart="never" nodeType="tmRoot"/>
+        <p:cTn id="1" dur="indefinite" restart="never" nodeType="tmRoot"/>
       </p:par>
     </p:tnLst>
   </p:timing>
@@ -26611,7 +26611,7 @@
   <p:timing>
     <p:tnLst>
       <p:par>
-        <p:cTn xmlns:p14="http://schemas.microsoft.com/office/powerpoint/2010/main" id="1" dur="indefinite" restart="never" nodeType="tmRoot"/>
+        <p:cTn id="1" dur="indefinite" restart="never" nodeType="tmRoot"/>
       </p:par>
     </p:tnLst>
   </p:timing>
@@ -26740,7 +26740,7 @@
   <p:timing>
     <p:tnLst>
       <p:par>
-        <p:cTn xmlns:p14="http://schemas.microsoft.com/office/powerpoint/2010/main" id="1" dur="indefinite" restart="never" nodeType="tmRoot"/>
+        <p:cTn id="1" dur="indefinite" restart="never" nodeType="tmRoot"/>
       </p:par>
     </p:tnLst>
   </p:timing>
@@ -28614,14 +28614,14 @@
           </a:ln>
           <a:extLst>
             <a:ext uri="{909E8E84-426E-40dd-AFC4-6F175D3DCCD1}">
-              <a14:hiddenFill xmlns:a14="http://schemas.microsoft.com/office/drawing/2010/main">
+              <a14:hiddenFill xmlns:a14="http://schemas.microsoft.com/office/drawing/2010/main" xmlns="">
                 <a:solidFill>
                   <a:srgbClr val="FFFFFF"/>
                 </a:solidFill>
               </a14:hiddenFill>
             </a:ext>
             <a:ext uri="{91240B29-F687-4f45-9708-019B960494DF}">
-              <a14:hiddenLine xmlns:a14="http://schemas.microsoft.com/office/drawing/2010/main" w="9525">
+              <a14:hiddenLine xmlns:a14="http://schemas.microsoft.com/office/drawing/2010/main" xmlns="" w="9525">
                 <a:solidFill>
                   <a:srgbClr val="000000"/>
                 </a:solidFill>
@@ -28646,7 +28646,7 @@
   <p:timing>
     <p:tnLst>
       <p:par>
-        <p:cTn xmlns:p14="http://schemas.microsoft.com/office/powerpoint/2010/main" id="1" dur="indefinite" restart="never" nodeType="tmRoot">
+        <p:cTn id="1" dur="indefinite" restart="never" nodeType="tmRoot">
           <p:childTnLst>
             <p:seq concurrent="1" nextAc="seek">
               <p:cTn id="2" dur="indefinite" nodeType="mainSeq">
@@ -30917,7 +30917,7 @@
   <p:timing>
     <p:tnLst>
       <p:par>
-        <p:cTn xmlns:p14="http://schemas.microsoft.com/office/powerpoint/2010/main" id="1" dur="indefinite" restart="never" nodeType="tmRoot">
+        <p:cTn id="1" dur="indefinite" restart="never" nodeType="tmRoot">
           <p:childTnLst>
             <p:seq concurrent="1" nextAc="seek">
               <p:cTn id="2" dur="indefinite" nodeType="mainSeq">

</xml_diff>